<commit_message>
Challenge 5 slides updated
</commit_message>
<xml_diff>
--- a/Slides/Challenge5.pptx
+++ b/Slides/Challenge5.pptx
@@ -234,7 +234,7 @@
             <a:fld id="{26C8E58E-DECE-40D6-94EE-88E795B4D60C}" type="datetimeFigureOut">
               <a:rPr lang="en-GB" smtClean="0"/>
               <a:pPr/>
-              <a:t>25/05/2016</a:t>
+              <a:t>02/06/2016</a:t>
             </a:fld>
             <a:endParaRPr lang="en-GB"/>
           </a:p>
@@ -2086,11 +2086,7 @@
             </a:pPr>
             <a:r>
               <a:rPr lang="en-GB" dirty="0" smtClean="0"/>
-              <a:t>Centralised </a:t>
-            </a:r>
-            <a:r>
-              <a:rPr lang="en-GB" dirty="0" smtClean="0"/>
-              <a:t>vs Distributed source control</a:t>
+              <a:t>Centralised vs Distributed source control</a:t>
             </a:r>
           </a:p>
           <a:p>
@@ -2443,15 +2439,7 @@
             </a:r>
             <a:r>
               <a:rPr lang="en-GB" dirty="0" smtClean="0"/>
-              <a:t>to get the code from all previous challenges </a:t>
-            </a:r>
-            <a:r>
-              <a:rPr lang="en-GB" dirty="0" smtClean="0"/>
-              <a:t>into </a:t>
-            </a:r>
-            <a:r>
-              <a:rPr lang="en-GB" dirty="0" smtClean="0"/>
-              <a:t>GIT:</a:t>
+              <a:t>to get the code from all previous challenges into GIT:</a:t>
             </a:r>
           </a:p>
           <a:p>
@@ -2461,7 +2449,35 @@
             </a:pPr>
             <a:r>
               <a:rPr lang="en-GB" dirty="0" smtClean="0"/>
-              <a:t>Clone the repo: </a:t>
+              <a:t>Clone the </a:t>
+            </a:r>
+            <a:r>
+              <a:rPr lang="en-GB" dirty="0" smtClean="0"/>
+              <a:t>repo (</a:t>
+            </a:r>
+            <a:r>
+              <a:rPr lang="en-GB" smtClean="0"/>
+              <a:t>ask </a:t>
+            </a:r>
+            <a:r>
+              <a:rPr lang="en-GB" smtClean="0"/>
+              <a:t>me </a:t>
+            </a:r>
+            <a:r>
+              <a:rPr lang="en-GB" smtClean="0"/>
+              <a:t>if </a:t>
+            </a:r>
+            <a:r>
+              <a:rPr lang="en-GB" dirty="0" smtClean="0"/>
+              <a:t>you don</a:t>
+            </a:r>
+            <a:r>
+              <a:rPr lang="en-GB" dirty="0" smtClean="0"/>
+              <a:t>’t have access)</a:t>
+            </a:r>
+            <a:r>
+              <a:rPr lang="en-GB" dirty="0" smtClean="0"/>
+              <a:t>: </a:t>
             </a:r>
             <a:r>
               <a:rPr lang="en-US" dirty="0" smtClean="0">
@@ -2481,10 +2497,7 @@
               </a:rPr>
               <a:t>git/QAPlusPlus</a:t>
             </a:r>
-            <a:r>
-              <a:rPr lang="en-US" dirty="0" smtClean="0"/>
-              <a:t> </a:t>
-            </a:r>
+            <a:endParaRPr lang="en-US" dirty="0" smtClean="0"/>
           </a:p>
           <a:p>
             <a:pPr marL="914400" lvl="1" indent="-514350">
@@ -2579,7 +2592,6 @@
               <a:rPr lang="en-GB" dirty="0" smtClean="0"/>
               <a:t>Merge your branch into Master</a:t>
             </a:r>
-            <a:endParaRPr lang="en-GB" dirty="0" smtClean="0"/>
           </a:p>
           <a:p>
             <a:pPr marL="514350" indent="-514350">
@@ -3366,23 +3378,6 @@
 </file>
 
 <file path=customXml/item1.xml><?xml version="1.0" encoding="utf-8"?>
-<?mso-contentType ?>
-<FormTemplates xmlns="http://schemas.microsoft.com/sharepoint/v3/contenttype/forms">
-  <Display>DocumentLibraryForm</Display>
-  <Edit>DocumentLibraryForm</Edit>
-  <New>DocumentLibraryForm</New>
-</FormTemplates>
-</file>
-
-<file path=customXml/item2.xml><?xml version="1.0" encoding="utf-8"?>
-<p:properties xmlns:p="http://schemas.microsoft.com/office/2006/metadata/properties" xmlns:xsi="http://www.w3.org/2001/XMLSchema-instance">
-  <documentManagement>
-    <SearchTags xmlns="e14b16d5-156c-486f-bc66-31acfa983c80">innovation</SearchTags>
-  </documentManagement>
-</p:properties>
-</file>
-
-<file path=customXml/item3.xml><?xml version="1.0" encoding="utf-8"?>
 <ct:contentTypeSchema xmlns:ct="http://schemas.microsoft.com/office/2006/metadata/contentType" xmlns:ma="http://schemas.microsoft.com/office/2006/metadata/properties/metaAttributes" ct:_="" ma:_="" ma:contentTypeName="Document" ma:contentTypeID="0x01010055589514685E044AB0688FFB41430692" ma:contentTypeVersion="1" ma:contentTypeDescription="Create a new document." ma:contentTypeScope="" ma:versionID="d4fb51d69261fd4ff80d12a1ec6016c7">
   <xsd:schema xmlns:xsd="http://www.w3.org/2001/XMLSchema" xmlns:p="http://schemas.microsoft.com/office/2006/metadata/properties" xmlns:ns2="e14b16d5-156c-486f-bc66-31acfa983c80" targetNamespace="http://schemas.microsoft.com/office/2006/metadata/properties" ma:root="true" ma:fieldsID="a9bc9304955844d84842a7639340fd8b" ns2:_="">
     <xsd:import namespace="e14b16d5-156c-486f-bc66-31acfa983c80"/>
@@ -3444,30 +3439,24 @@
 </ct:contentTypeSchema>
 </file>
 
-<file path=customXml/itemProps1.xml><?xml version="1.0" encoding="utf-8"?>
-<ds:datastoreItem xmlns:ds="http://schemas.openxmlformats.org/officeDocument/2006/customXml" ds:itemID="{488BD870-74E3-4DF5-B398-1E25D25065DA}">
-  <ds:schemaRefs>
-    <ds:schemaRef ds:uri="http://schemas.microsoft.com/sharepoint/v3/contenttype/forms"/>
-  </ds:schemaRefs>
-</ds:datastoreItem>
+<file path=customXml/item2.xml><?xml version="1.0" encoding="utf-8"?>
+<p:properties xmlns:p="http://schemas.microsoft.com/office/2006/metadata/properties" xmlns:xsi="http://www.w3.org/2001/XMLSchema-instance">
+  <documentManagement>
+    <SearchTags xmlns="e14b16d5-156c-486f-bc66-31acfa983c80">innovation</SearchTags>
+  </documentManagement>
+</p:properties>
 </file>
 
-<file path=customXml/itemProps2.xml><?xml version="1.0" encoding="utf-8"?>
-<ds:datastoreItem xmlns:ds="http://schemas.openxmlformats.org/officeDocument/2006/customXml" ds:itemID="{C7307C6B-CCFD-4E11-8DD1-4A1BAE9C4146}">
-  <ds:schemaRefs>
-    <ds:schemaRef ds:uri="http://purl.org/dc/dcmitype/"/>
-    <ds:schemaRef ds:uri="http://purl.org/dc/terms/"/>
-    <ds:schemaRef ds:uri="http://purl.org/dc/elements/1.1/"/>
-    <ds:schemaRef ds:uri="http://schemas.openxmlformats.org/package/2006/metadata/core-properties"/>
-    <ds:schemaRef ds:uri="http://www.w3.org/XML/1998/namespace"/>
-    <ds:schemaRef ds:uri="http://schemas.microsoft.com/office/2006/metadata/properties"/>
-    <ds:schemaRef ds:uri="http://schemas.microsoft.com/office/2006/documentManagement/types"/>
-    <ds:schemaRef ds:uri="e14b16d5-156c-486f-bc66-31acfa983c80"/>
-  </ds:schemaRefs>
-</ds:datastoreItem>
+<file path=customXml/item3.xml><?xml version="1.0" encoding="utf-8"?>
+<?mso-contentType ?>
+<FormTemplates xmlns="http://schemas.microsoft.com/sharepoint/v3/contenttype/forms">
+  <Display>DocumentLibraryForm</Display>
+  <Edit>DocumentLibraryForm</Edit>
+  <New>DocumentLibraryForm</New>
+</FormTemplates>
 </file>
 
-<file path=customXml/itemProps3.xml><?xml version="1.0" encoding="utf-8"?>
+<file path=customXml/itemProps1.xml><?xml version="1.0" encoding="utf-8"?>
 <ds:datastoreItem xmlns:ds="http://schemas.openxmlformats.org/officeDocument/2006/customXml" ds:itemID="{70CB8D8F-550D-40F2-B8FB-523AFB634341}">
   <ds:schemaRefs>
     <ds:schemaRef ds:uri="http://schemas.microsoft.com/office/2006/metadata/contentType"/>
@@ -3482,4 +3471,27 @@
     <ds:schemaRef ds:uri="http://schemas.microsoft.com/office/internal/2005/internalDocumentation"/>
   </ds:schemaRefs>
 </ds:datastoreItem>
+</file>
+
+<file path=customXml/itemProps2.xml><?xml version="1.0" encoding="utf-8"?>
+<ds:datastoreItem xmlns:ds="http://schemas.openxmlformats.org/officeDocument/2006/customXml" ds:itemID="{C7307C6B-CCFD-4E11-8DD1-4A1BAE9C4146}">
+  <ds:schemaRefs>
+    <ds:schemaRef ds:uri="http://schemas.openxmlformats.org/package/2006/metadata/core-properties"/>
+    <ds:schemaRef ds:uri="http://purl.org/dc/dcmitype/"/>
+    <ds:schemaRef ds:uri="e14b16d5-156c-486f-bc66-31acfa983c80"/>
+    <ds:schemaRef ds:uri="http://www.w3.org/XML/1998/namespace"/>
+    <ds:schemaRef ds:uri="http://purl.org/dc/elements/1.1/"/>
+    <ds:schemaRef ds:uri="http://schemas.microsoft.com/office/2006/documentManagement/types"/>
+    <ds:schemaRef ds:uri="http://schemas.microsoft.com/office/2006/metadata/properties"/>
+    <ds:schemaRef ds:uri="http://purl.org/dc/terms/"/>
+  </ds:schemaRefs>
+</ds:datastoreItem>
+</file>
+
+<file path=customXml/itemProps3.xml><?xml version="1.0" encoding="utf-8"?>
+<ds:datastoreItem xmlns:ds="http://schemas.openxmlformats.org/officeDocument/2006/customXml" ds:itemID="{488BD870-74E3-4DF5-B398-1E25D25065DA}">
+  <ds:schemaRefs>
+    <ds:schemaRef ds:uri="http://schemas.microsoft.com/sharepoint/v3/contenttype/forms"/>
+  </ds:schemaRefs>
+</ds:datastoreItem>
 </file>
</xml_diff>